<commit_message>
Last update of presentation
</commit_message>
<xml_diff>
--- a/Perf Eval - Final presentation.pptx
+++ b/Perf Eval - Final presentation.pptx
@@ -218,7 +218,7 @@
           <a:p>
             <a:fld id="{57BD9E6B-C072-4D7A-B59A-50AC8BFD878C}" type="datetimeFigureOut">
               <a:rPr lang="fr-CH" smtClean="0"/>
-              <a:t>28.05.2015</a:t>
+              <a:t>29.05.2015</a:t>
             </a:fld>
             <a:endParaRPr lang="fr-CH"/>
           </a:p>
@@ -885,7 +885,7 @@
           <a:p>
             <a:fld id="{B932173E-4693-4338-8F61-3C49B31EA072}" type="datetimeFigureOut">
               <a:rPr lang="fr-CH" smtClean="0"/>
-              <a:t>28.05.2015</a:t>
+              <a:t>29.05.2015</a:t>
             </a:fld>
             <a:endParaRPr lang="fr-CH"/>
           </a:p>
@@ -1055,7 +1055,7 @@
           <a:p>
             <a:fld id="{B932173E-4693-4338-8F61-3C49B31EA072}" type="datetimeFigureOut">
               <a:rPr lang="fr-CH" smtClean="0"/>
-              <a:t>28.05.2015</a:t>
+              <a:t>29.05.2015</a:t>
             </a:fld>
             <a:endParaRPr lang="fr-CH"/>
           </a:p>
@@ -1235,7 +1235,7 @@
           <a:p>
             <a:fld id="{B932173E-4693-4338-8F61-3C49B31EA072}" type="datetimeFigureOut">
               <a:rPr lang="fr-CH" smtClean="0"/>
-              <a:t>28.05.2015</a:t>
+              <a:t>29.05.2015</a:t>
             </a:fld>
             <a:endParaRPr lang="fr-CH"/>
           </a:p>
@@ -3112,7 +3112,7 @@
           <a:p>
             <a:fld id="{B932173E-4693-4338-8F61-3C49B31EA072}" type="datetimeFigureOut">
               <a:rPr lang="fr-CH" smtClean="0"/>
-              <a:t>28.05.2015</a:t>
+              <a:t>29.05.2015</a:t>
             </a:fld>
             <a:endParaRPr lang="fr-CH"/>
           </a:p>
@@ -4271,7 +4271,7 @@
           <a:p>
             <a:fld id="{B932173E-4693-4338-8F61-3C49B31EA072}" type="datetimeFigureOut">
               <a:rPr lang="fr-CH" smtClean="0"/>
-              <a:t>28.05.2015</a:t>
+              <a:t>29.05.2015</a:t>
             </a:fld>
             <a:endParaRPr lang="fr-CH"/>
           </a:p>
@@ -4503,7 +4503,7 @@
           <a:p>
             <a:fld id="{B932173E-4693-4338-8F61-3C49B31EA072}" type="datetimeFigureOut">
               <a:rPr lang="fr-CH" smtClean="0"/>
-              <a:t>28.05.2015</a:t>
+              <a:t>29.05.2015</a:t>
             </a:fld>
             <a:endParaRPr lang="fr-CH"/>
           </a:p>
@@ -4870,7 +4870,7 @@
           <a:p>
             <a:fld id="{B932173E-4693-4338-8F61-3C49B31EA072}" type="datetimeFigureOut">
               <a:rPr lang="fr-CH" smtClean="0"/>
-              <a:t>28.05.2015</a:t>
+              <a:t>29.05.2015</a:t>
             </a:fld>
             <a:endParaRPr lang="fr-CH"/>
           </a:p>
@@ -4988,7 +4988,7 @@
           <a:p>
             <a:fld id="{B932173E-4693-4338-8F61-3C49B31EA072}" type="datetimeFigureOut">
               <a:rPr lang="fr-CH" smtClean="0"/>
-              <a:t>28.05.2015</a:t>
+              <a:t>29.05.2015</a:t>
             </a:fld>
             <a:endParaRPr lang="fr-CH"/>
           </a:p>
@@ -5083,7 +5083,7 @@
           <a:p>
             <a:fld id="{B932173E-4693-4338-8F61-3C49B31EA072}" type="datetimeFigureOut">
               <a:rPr lang="fr-CH" smtClean="0"/>
-              <a:t>28.05.2015</a:t>
+              <a:t>29.05.2015</a:t>
             </a:fld>
             <a:endParaRPr lang="fr-CH"/>
           </a:p>
@@ -5360,7 +5360,7 @@
           <a:p>
             <a:fld id="{B932173E-4693-4338-8F61-3C49B31EA072}" type="datetimeFigureOut">
               <a:rPr lang="fr-CH" smtClean="0"/>
-              <a:t>28.05.2015</a:t>
+              <a:t>29.05.2015</a:t>
             </a:fld>
             <a:endParaRPr lang="fr-CH"/>
           </a:p>
@@ -5613,7 +5613,7 @@
           <a:p>
             <a:fld id="{B932173E-4693-4338-8F61-3C49B31EA072}" type="datetimeFigureOut">
               <a:rPr lang="fr-CH" smtClean="0"/>
-              <a:t>28.05.2015</a:t>
+              <a:t>29.05.2015</a:t>
             </a:fld>
             <a:endParaRPr lang="fr-CH"/>
           </a:p>
@@ -5835,7 +5835,7 @@
           <a:p>
             <a:fld id="{B932173E-4693-4338-8F61-3C49B31EA072}" type="datetimeFigureOut">
               <a:rPr lang="fr-CH" smtClean="0"/>
-              <a:t>28.05.2015</a:t>
+              <a:t>29.05.2015</a:t>
             </a:fld>
             <a:endParaRPr lang="fr-CH"/>
           </a:p>
@@ -7743,8 +7743,14 @@
                 </a:solidFill>
                 <a:latin typeface="+mn-lt"/>
               </a:rPr>
-              <a:t>:</a:t>
-            </a:r>
+              <a:t> :</a:t>
+            </a:r>
+            <a:endParaRPr lang="fr-CH" altLang="en-US" sz="3600" b="1" dirty="0" smtClean="0">
+              <a:solidFill>
+                <a:srgbClr val="0099CC"/>
+              </a:solidFill>
+              <a:latin typeface="+mn-lt"/>
+            </a:endParaRPr>
           </a:p>
           <a:p>
             <a:pPr algn="ctr" eaLnBrk="0" fontAlgn="base" hangingPunct="0">
@@ -8042,15 +8048,7 @@
                   <a:srgbClr val="5F5F5F"/>
                 </a:solidFill>
               </a:rPr>
-              <a:t>Give suitable architecture depending on average clients </a:t>
-            </a:r>
-            <a:r>
-              <a:rPr lang="en-US" sz="2200" dirty="0" smtClean="0">
-                <a:solidFill>
-                  <a:srgbClr val="5F5F5F"/>
-                </a:solidFill>
-              </a:rPr>
-              <a:t>served</a:t>
+              <a:t>Give suitable architecture depending on average clients served</a:t>
             </a:r>
             <a:endParaRPr lang="en-US" sz="2200" dirty="0" smtClean="0"/>
           </a:p>
@@ -10563,7 +10561,23 @@
                   <a:srgbClr val="5F5F5F"/>
                 </a:solidFill>
               </a:rPr>
-              <a:t>NIO architectures already “better” than the IO ones.</a:t>
+              <a:t>NIO architectures </a:t>
+            </a:r>
+            <a:r>
+              <a:rPr lang="en-US" sz="2200" dirty="0" smtClean="0">
+                <a:solidFill>
+                  <a:srgbClr val="5F5F5F"/>
+                </a:solidFill>
+              </a:rPr>
+              <a:t>tend to be “better</a:t>
+            </a:r>
+            <a:r>
+              <a:rPr lang="en-US" sz="2200" dirty="0" smtClean="0">
+                <a:solidFill>
+                  <a:srgbClr val="5F5F5F"/>
+                </a:solidFill>
+              </a:rPr>
+              <a:t>” than the IO ones.</a:t>
             </a:r>
           </a:p>
           <a:p>
@@ -11899,7 +11913,15 @@
                   <a:srgbClr val="5F5F5F"/>
                 </a:solidFill>
               </a:rPr>
-              <a:t>What is a Key-Value Store</a:t>
+              <a:t>What is a Key-Value </a:t>
+            </a:r>
+            <a:r>
+              <a:rPr lang="en-US" sz="2200" dirty="0" smtClean="0">
+                <a:solidFill>
+                  <a:srgbClr val="5F5F5F"/>
+                </a:solidFill>
+              </a:rPr>
+              <a:t>Data-Store</a:t>
             </a:r>
             <a:endParaRPr lang="en-US" sz="2200" dirty="0">
               <a:solidFill>
@@ -12620,7 +12642,15 @@
                   <a:srgbClr val="5F5F5F"/>
                 </a:solidFill>
               </a:rPr>
-              <a:t> </a:t>
+              <a:t> pays off after 25 parallel clients. Before that, </a:t>
+            </a:r>
+            <a:r>
+              <a:rPr lang="en-US" sz="2200" dirty="0" err="1" smtClean="0">
+                <a:solidFill>
+                  <a:srgbClr val="5F5F5F"/>
+                </a:solidFill>
+              </a:rPr>
+              <a:t>IOSingle</a:t>
             </a:r>
             <a:r>
               <a:rPr lang="en-US" sz="2200" dirty="0" smtClean="0">
@@ -12628,7 +12658,7 @@
                   <a:srgbClr val="5F5F5F"/>
                 </a:solidFill>
               </a:rPr>
-              <a:t>pays </a:t>
+              <a:t> is the best architecture </a:t>
             </a:r>
             <a:r>
               <a:rPr lang="en-US" sz="2200" dirty="0" smtClean="0">
@@ -12636,7 +12666,7 @@
                   <a:srgbClr val="5F5F5F"/>
                 </a:solidFill>
               </a:rPr>
-              <a:t>off after 25 parallel clients. </a:t>
+              <a:t>among the </a:t>
             </a:r>
             <a:r>
               <a:rPr lang="en-US" sz="2200" dirty="0" smtClean="0">
@@ -12644,55 +12674,7 @@
                   <a:srgbClr val="5F5F5F"/>
                 </a:solidFill>
               </a:rPr>
-              <a:t>Before that, </a:t>
-            </a:r>
-            <a:r>
-              <a:rPr lang="en-US" sz="2200" dirty="0" err="1" smtClean="0">
-                <a:solidFill>
-                  <a:srgbClr val="5F5F5F"/>
-                </a:solidFill>
-              </a:rPr>
-              <a:t>IOSingle</a:t>
-            </a:r>
-            <a:r>
-              <a:rPr lang="en-US" sz="2200" dirty="0" smtClean="0">
-                <a:solidFill>
-                  <a:srgbClr val="5F5F5F"/>
-                </a:solidFill>
-              </a:rPr>
-              <a:t> is the best </a:t>
-            </a:r>
-            <a:r>
-              <a:rPr lang="en-US" sz="2200" dirty="0" smtClean="0">
-                <a:solidFill>
-                  <a:srgbClr val="5F5F5F"/>
-                </a:solidFill>
-              </a:rPr>
-              <a:t>architecture for </a:t>
-            </a:r>
-            <a:r>
-              <a:rPr lang="en-US" sz="2200" dirty="0" smtClean="0">
-                <a:solidFill>
-                  <a:srgbClr val="5F5F5F"/>
-                </a:solidFill>
-              </a:rPr>
-              <a:t>the IO ones. After that, avoid </a:t>
-            </a:r>
-            <a:r>
-              <a:rPr lang="en-US" sz="2200" dirty="0" smtClean="0">
-                <a:solidFill>
-                  <a:srgbClr val="5F5F5F"/>
-                </a:solidFill>
-              </a:rPr>
-              <a:t>the use </a:t>
-            </a:r>
-            <a:r>
-              <a:rPr lang="en-US" sz="2200" dirty="0" smtClean="0">
-                <a:solidFill>
-                  <a:srgbClr val="5F5F5F"/>
-                </a:solidFill>
-              </a:rPr>
-              <a:t>of </a:t>
+              <a:t>IO ones. After that, avoid the use of </a:t>
             </a:r>
             <a:r>
               <a:rPr lang="en-US" sz="2200" dirty="0" err="1" smtClean="0">
@@ -13133,8 +13115,25 @@
                 <a:ea typeface="+mj-ea"/>
                 <a:cs typeface="+mj-cs"/>
               </a:rPr>
-              <a:t> of a Key-Value store</a:t>
-            </a:r>
+              <a:t> of a Key-Value </a:t>
+            </a:r>
+            <a:r>
+              <a:rPr lang="fr-CH" sz="3600" b="1" dirty="0" smtClean="0">
+                <a:solidFill>
+                  <a:srgbClr val="0099CC"/>
+                </a:solidFill>
+                <a:ea typeface="+mj-ea"/>
+                <a:cs typeface="+mj-cs"/>
+              </a:rPr>
+              <a:t>Data-Store</a:t>
+            </a:r>
+            <a:endParaRPr lang="fr-CH" sz="3600" b="1" dirty="0">
+              <a:solidFill>
+                <a:srgbClr val="0099CC"/>
+              </a:solidFill>
+              <a:ea typeface="+mj-ea"/>
+              <a:cs typeface="+mj-cs"/>
+            </a:endParaRPr>
           </a:p>
         </p:txBody>
       </p:sp>
@@ -13849,8 +13848,23 @@
                 </a:solidFill>
                 <a:latin typeface="+mn-lt"/>
               </a:rPr>
-              <a:t>Key-Value Store</a:t>
-            </a:r>
+              <a:t>Key-Value </a:t>
+            </a:r>
+            <a:r>
+              <a:rPr lang="fr-CH" altLang="en-US" sz="3600" b="1" dirty="0" smtClean="0">
+                <a:solidFill>
+                  <a:srgbClr val="0099CC"/>
+                </a:solidFill>
+                <a:latin typeface="+mn-lt"/>
+              </a:rPr>
+              <a:t>Data-Store</a:t>
+            </a:r>
+            <a:endParaRPr lang="fr-CH" altLang="en-US" sz="3600" b="1" dirty="0" smtClean="0">
+              <a:solidFill>
+                <a:srgbClr val="0099CC"/>
+              </a:solidFill>
+              <a:latin typeface="+mn-lt"/>
+            </a:endParaRPr>
           </a:p>
         </p:txBody>
       </p:sp>
@@ -14063,23 +14077,7 @@
                   <a:srgbClr val="5F5F5F"/>
                 </a:solidFill>
               </a:rPr>
-              <a:t>Single </a:t>
-            </a:r>
-            <a:r>
-              <a:rPr lang="en-US" sz="2200" dirty="0" smtClean="0">
-                <a:solidFill>
-                  <a:srgbClr val="5F5F5F"/>
-                </a:solidFill>
-              </a:rPr>
-              <a:t>vs </a:t>
-            </a:r>
-            <a:r>
-              <a:rPr lang="en-US" sz="2200" dirty="0" smtClean="0">
-                <a:solidFill>
-                  <a:srgbClr val="5F5F5F"/>
-                </a:solidFill>
-              </a:rPr>
-              <a:t>Multi Threaded</a:t>
+              <a:t>Single vs Multi Threaded</a:t>
             </a:r>
           </a:p>
           <a:p>
@@ -14106,7 +14104,7 @@
                   <a:srgbClr val="5F5F5F"/>
                 </a:solidFill>
               </a:rPr>
-              <a:t>Blocking </a:t>
+              <a:t>Blocking vs Pipelined </a:t>
             </a:r>
             <a:r>
               <a:rPr lang="en-US" sz="2200" dirty="0" smtClean="0">
@@ -14114,16 +14112,13 @@
                   <a:srgbClr val="5F5F5F"/>
                 </a:solidFill>
               </a:rPr>
-              <a:t>vs </a:t>
-            </a:r>
-            <a:r>
-              <a:rPr lang="en-US" sz="2200" dirty="0" smtClean="0">
-                <a:solidFill>
-                  <a:srgbClr val="5F5F5F"/>
-                </a:solidFill>
-              </a:rPr>
-              <a:t>Pipelined version</a:t>
-            </a:r>
+              <a:t>architecture</a:t>
+            </a:r>
+            <a:endParaRPr lang="en-US" sz="2200" dirty="0" smtClean="0">
+              <a:solidFill>
+                <a:srgbClr val="5F5F5F"/>
+              </a:solidFill>
+            </a:endParaRPr>
           </a:p>
           <a:p>
             <a:pPr marL="342900" indent="-342900" eaLnBrk="0" fontAlgn="base" hangingPunct="0">
@@ -15068,15 +15063,7 @@
                   <a:srgbClr val="5F5F5F"/>
                 </a:solidFill>
               </a:rPr>
-              <a:t>Give suitable architecture depending on average clients </a:t>
-            </a:r>
-            <a:r>
-              <a:rPr lang="en-US" sz="2200" dirty="0" smtClean="0">
-                <a:solidFill>
-                  <a:srgbClr val="5F5F5F"/>
-                </a:solidFill>
-              </a:rPr>
-              <a:t>served</a:t>
+              <a:t>Give suitable architecture depending on average clients served</a:t>
             </a:r>
             <a:endParaRPr lang="en-US" sz="2200" dirty="0" smtClean="0"/>
           </a:p>

</xml_diff>